<commit_message>
Last minute aanpassingen aan presentatie
</commit_message>
<xml_diff>
--- a/Week2/Presentatie.pptx
+++ b/Week2/Presentatie.pptx
@@ -5,7 +5,7 @@
     <p:sldMasterId id="2147483648" r:id="rId1"/>
   </p:sldMasterIdLst>
   <p:notesMasterIdLst>
-    <p:notesMasterId r:id="rId24"/>
+    <p:notesMasterId r:id="rId25"/>
   </p:notesMasterIdLst>
   <p:sldIdLst>
     <p:sldId id="256" r:id="rId2"/>
@@ -18,18 +18,19 @@
     <p:sldId id="303" r:id="rId9"/>
     <p:sldId id="305" r:id="rId10"/>
     <p:sldId id="304" r:id="rId11"/>
-    <p:sldId id="306" r:id="rId12"/>
-    <p:sldId id="301" r:id="rId13"/>
-    <p:sldId id="307" r:id="rId14"/>
-    <p:sldId id="308" r:id="rId15"/>
-    <p:sldId id="309" r:id="rId16"/>
-    <p:sldId id="318" r:id="rId17"/>
-    <p:sldId id="311" r:id="rId18"/>
-    <p:sldId id="312" r:id="rId19"/>
-    <p:sldId id="313" r:id="rId20"/>
-    <p:sldId id="319" r:id="rId21"/>
-    <p:sldId id="315" r:id="rId22"/>
-    <p:sldId id="316" r:id="rId23"/>
+    <p:sldId id="320" r:id="rId12"/>
+    <p:sldId id="306" r:id="rId13"/>
+    <p:sldId id="301" r:id="rId14"/>
+    <p:sldId id="307" r:id="rId15"/>
+    <p:sldId id="308" r:id="rId16"/>
+    <p:sldId id="309" r:id="rId17"/>
+    <p:sldId id="318" r:id="rId18"/>
+    <p:sldId id="311" r:id="rId19"/>
+    <p:sldId id="312" r:id="rId20"/>
+    <p:sldId id="313" r:id="rId21"/>
+    <p:sldId id="319" r:id="rId22"/>
+    <p:sldId id="315" r:id="rId23"/>
+    <p:sldId id="316" r:id="rId24"/>
   </p:sldIdLst>
   <p:sldSz cx="9144000" cy="5143500" type="screen16x9"/>
   <p:notesSz cx="6858000" cy="9144000"/>
@@ -635,7 +636,7 @@
           <a:p>
             <a:fld id="{86D768CA-A0F6-4DBB-9A05-5F1444741938}" type="slidenum">
               <a:rPr lang="nl-NL" smtClean="0"/>
-              <a:t>12</a:t>
+              <a:t>13</a:t>
             </a:fld>
             <a:endParaRPr lang="nl-NL"/>
           </a:p>
@@ -719,7 +720,7 @@
           <a:p>
             <a:fld id="{86D768CA-A0F6-4DBB-9A05-5F1444741938}" type="slidenum">
               <a:rPr lang="nl-NL" smtClean="0"/>
-              <a:t>13</a:t>
+              <a:t>14</a:t>
             </a:fld>
             <a:endParaRPr lang="nl-NL"/>
           </a:p>
@@ -3785,7 +3786,6 @@
               <a:rPr lang="nl-NL" sz="2000" dirty="0" smtClean="0"/>
               <a:t>24 mei 2024</a:t>
             </a:r>
-            <a:endParaRPr lang="nl-NL" sz="2000" dirty="0" smtClean="0"/>
           </a:p>
         </p:txBody>
       </p:sp>
@@ -4928,6 +4928,1140 @@
   <p:timing>
     <p:tnLst>
       <p:par>
+        <p:cTn id="1" dur="indefinite" restart="never" nodeType="tmRoot"/>
+      </p:par>
+    </p:tnLst>
+  </p:timing>
+</p:sld>
+</file>
+
+<file path=ppt/slides/slide11.xml><?xml version="1.0" encoding="utf-8"?>
+<p:sld xmlns:a="http://schemas.openxmlformats.org/drawingml/2006/main" xmlns:r="http://schemas.openxmlformats.org/officeDocument/2006/relationships" xmlns:p="http://schemas.openxmlformats.org/presentationml/2006/main">
+  <p:cSld>
+    <p:spTree>
+      <p:nvGrpSpPr>
+        <p:cNvPr id="1" name=""/>
+        <p:cNvGrpSpPr/>
+        <p:nvPr/>
+      </p:nvGrpSpPr>
+      <p:grpSpPr>
+        <a:xfrm>
+          <a:off x="0" y="0"/>
+          <a:ext cx="0" cy="0"/>
+          <a:chOff x="0" y="0"/>
+          <a:chExt cx="0" cy="0"/>
+        </a:xfrm>
+      </p:grpSpPr>
+      <p:sp>
+        <p:nvSpPr>
+          <p:cNvPr id="2" name="Titel 1"/>
+          <p:cNvSpPr>
+            <a:spLocks noGrp="1"/>
+          </p:cNvSpPr>
+          <p:nvPr>
+            <p:ph type="title"/>
+          </p:nvPr>
+        </p:nvSpPr>
+        <p:spPr/>
+        <p:txBody>
+          <a:bodyPr/>
+          <a:lstStyle/>
+          <a:p>
+            <a:r>
+              <a:rPr lang="nl-NL" dirty="0" err="1" smtClean="0"/>
+              <a:t>Tuples</a:t>
+            </a:r>
+            <a:endParaRPr lang="nl-NL" dirty="0"/>
+          </a:p>
+        </p:txBody>
+      </p:sp>
+      <p:sp>
+        <p:nvSpPr>
+          <p:cNvPr id="3" name="Tijdelijke aanduiding voor inhoud 2"/>
+          <p:cNvSpPr>
+            <a:spLocks noGrp="1"/>
+          </p:cNvSpPr>
+          <p:nvPr>
+            <p:ph idx="1"/>
+          </p:nvPr>
+        </p:nvSpPr>
+        <p:spPr/>
+        <p:txBody>
+          <a:bodyPr>
+            <a:normAutofit/>
+          </a:bodyPr>
+          <a:lstStyle/>
+          <a:p>
+            <a:r>
+              <a:rPr lang="nl-NL" sz="2800" dirty="0" smtClean="0"/>
+              <a:t>Een </a:t>
+            </a:r>
+            <a:r>
+              <a:rPr lang="nl-NL" sz="2400" dirty="0" err="1" smtClean="0">
+                <a:latin typeface="Consolas" panose="020B0609020204030204" pitchFamily="49" charset="0"/>
+              </a:rPr>
+              <a:t>Tuple</a:t>
+            </a:r>
+            <a:r>
+              <a:rPr lang="nl-NL" sz="2800" dirty="0" smtClean="0"/>
+              <a:t> is een verzameling van waarden van </a:t>
+            </a:r>
+            <a:r>
+              <a:rPr lang="nl-NL" sz="2800" i="1" dirty="0" smtClean="0"/>
+              <a:t>mogelijk verschillende</a:t>
+            </a:r>
+            <a:r>
+              <a:rPr lang="nl-NL" sz="2800" dirty="0" smtClean="0"/>
+              <a:t> types</a:t>
+            </a:r>
+          </a:p>
+          <a:p>
+            <a:r>
+              <a:rPr lang="nl-NL" sz="2400" dirty="0" smtClean="0">
+                <a:latin typeface="Consolas" panose="020B0609020204030204" pitchFamily="49" charset="0"/>
+              </a:rPr>
+              <a:t>(1, </a:t>
+            </a:r>
+            <a:r>
+              <a:rPr lang="nl-NL" sz="2400" dirty="0" err="1" smtClean="0">
+                <a:latin typeface="Consolas" panose="020B0609020204030204" pitchFamily="49" charset="0"/>
+              </a:rPr>
+              <a:t>false</a:t>
+            </a:r>
+            <a:r>
+              <a:rPr lang="nl-NL" sz="2400" dirty="0" smtClean="0">
+                <a:latin typeface="Consolas" panose="020B0609020204030204" pitchFamily="49" charset="0"/>
+              </a:rPr>
+              <a:t>, "abc")	: (Int, </a:t>
+            </a:r>
+            <a:r>
+              <a:rPr lang="nl-NL" sz="2400" dirty="0" err="1" smtClean="0">
+                <a:latin typeface="Consolas" panose="020B0609020204030204" pitchFamily="49" charset="0"/>
+              </a:rPr>
+              <a:t>Boolean</a:t>
+            </a:r>
+            <a:r>
+              <a:rPr lang="nl-NL" sz="2400" dirty="0" smtClean="0">
+                <a:latin typeface="Consolas" panose="020B0609020204030204" pitchFamily="49" charset="0"/>
+              </a:rPr>
+              <a:t>, String)</a:t>
+            </a:r>
+            <a:endParaRPr lang="nl-NL" sz="2800" dirty="0" smtClean="0">
+              <a:latin typeface="Consolas" panose="020B0609020204030204" pitchFamily="49" charset="0"/>
+            </a:endParaRPr>
+          </a:p>
+          <a:p>
+            <a:r>
+              <a:rPr lang="nl-NL" sz="2800" dirty="0" smtClean="0"/>
+              <a:t>Het type van een </a:t>
+            </a:r>
+            <a:r>
+              <a:rPr lang="nl-NL" sz="2400" dirty="0" err="1" smtClean="0">
+                <a:latin typeface="Consolas" panose="020B0609020204030204" pitchFamily="49" charset="0"/>
+              </a:rPr>
+              <a:t>Tuple</a:t>
+            </a:r>
+            <a:r>
+              <a:rPr lang="nl-NL" sz="2800" dirty="0" smtClean="0"/>
+              <a:t> bepaald zowel de lengte (aantal elementen) als de volgorde waarin de elementen in het </a:t>
+            </a:r>
+            <a:r>
+              <a:rPr lang="nl-NL" sz="2400" dirty="0" err="1" smtClean="0">
+                <a:latin typeface="Consolas" panose="020B0609020204030204" pitchFamily="49" charset="0"/>
+              </a:rPr>
+              <a:t>Tuple</a:t>
+            </a:r>
+            <a:r>
+              <a:rPr lang="nl-NL" sz="2800" dirty="0" smtClean="0"/>
+              <a:t> zitten</a:t>
+            </a:r>
+            <a:endParaRPr lang="nl-NL" sz="2800" dirty="0"/>
+          </a:p>
+        </p:txBody>
+      </p:sp>
+      <p:grpSp>
+        <p:nvGrpSpPr>
+          <p:cNvPr id="4" name="Groep 3"/>
+          <p:cNvGrpSpPr/>
+          <p:nvPr/>
+        </p:nvGrpSpPr>
+        <p:grpSpPr>
+          <a:xfrm>
+            <a:off x="323528" y="357504"/>
+            <a:ext cx="8640960" cy="4446494"/>
+            <a:chOff x="323528" y="357504"/>
+            <a:chExt cx="8640960" cy="4446494"/>
+          </a:xfrm>
+        </p:grpSpPr>
+        <p:sp>
+          <p:nvSpPr>
+            <p:cNvPr id="5" name="Rechthoek 4"/>
+            <p:cNvSpPr/>
+            <p:nvPr/>
+          </p:nvSpPr>
+          <p:spPr>
+            <a:xfrm>
+              <a:off x="323528" y="357504"/>
+              <a:ext cx="8640960" cy="4446494"/>
+            </a:xfrm>
+            <a:prstGeom prst="rect">
+              <a:avLst/>
+            </a:prstGeom>
+            <a:solidFill>
+              <a:schemeClr val="tx1">
+                <a:alpha val="88000"/>
+              </a:schemeClr>
+            </a:solidFill>
+            <a:ln>
+              <a:noFill/>
+            </a:ln>
+          </p:spPr>
+          <p:style>
+            <a:lnRef idx="2">
+              <a:schemeClr val="accent1">
+                <a:shade val="50000"/>
+              </a:schemeClr>
+            </a:lnRef>
+            <a:fillRef idx="1">
+              <a:schemeClr val="accent1"/>
+            </a:fillRef>
+            <a:effectRef idx="0">
+              <a:schemeClr val="accent1"/>
+            </a:effectRef>
+            <a:fontRef idx="minor">
+              <a:schemeClr val="lt1"/>
+            </a:fontRef>
+          </p:style>
+          <p:txBody>
+            <a:bodyPr rtlCol="0" anchor="ctr"/>
+            <a:lstStyle/>
+            <a:p>
+              <a:pPr algn="ctr"/>
+              <a:endParaRPr lang="nl-NL" dirty="0"/>
+            </a:p>
+          </p:txBody>
+        </p:sp>
+        <p:sp>
+          <p:nvSpPr>
+            <p:cNvPr id="6" name="Tekstvak 5"/>
+            <p:cNvSpPr txBox="1"/>
+            <p:nvPr/>
+          </p:nvSpPr>
+          <p:spPr>
+            <a:xfrm>
+              <a:off x="323528" y="357504"/>
+              <a:ext cx="8640960" cy="4247317"/>
+            </a:xfrm>
+            <a:prstGeom prst="rect">
+              <a:avLst/>
+            </a:prstGeom>
+            <a:noFill/>
+          </p:spPr>
+          <p:txBody>
+            <a:bodyPr wrap="square" rtlCol="0">
+              <a:spAutoFit/>
+            </a:bodyPr>
+            <a:lstStyle/>
+            <a:p>
+              <a:endParaRPr lang="nl-NL" b="1" dirty="0" smtClean="0">
+                <a:solidFill>
+                  <a:schemeClr val="bg1"/>
+                </a:solidFill>
+                <a:latin typeface="Consolas" panose="020B0609020204030204" pitchFamily="49" charset="0"/>
+              </a:endParaRPr>
+            </a:p>
+            <a:p>
+              <a:endParaRPr lang="nl-NL" b="1" dirty="0" smtClean="0">
+                <a:solidFill>
+                  <a:schemeClr val="bg1"/>
+                </a:solidFill>
+                <a:latin typeface="Consolas" panose="020B0609020204030204" pitchFamily="49" charset="0"/>
+              </a:endParaRPr>
+            </a:p>
+            <a:p>
+              <a:endParaRPr lang="nl-NL" b="1" dirty="0" smtClean="0">
+                <a:solidFill>
+                  <a:schemeClr val="bg1"/>
+                </a:solidFill>
+                <a:latin typeface="Consolas" panose="020B0609020204030204" pitchFamily="49" charset="0"/>
+              </a:endParaRPr>
+            </a:p>
+            <a:p>
+              <a:r>
+                <a:rPr lang="en-US" b="1" dirty="0" err="1">
+                  <a:solidFill>
+                    <a:srgbClr val="CC7833"/>
+                  </a:solidFill>
+                  <a:latin typeface="Consolas" panose="020B0609020204030204" pitchFamily="49" charset="0"/>
+                </a:rPr>
+                <a:t>val</a:t>
+              </a:r>
+              <a:r>
+                <a:rPr lang="en-US" b="1" dirty="0">
+                  <a:solidFill>
+                    <a:schemeClr val="bg1"/>
+                  </a:solidFill>
+                  <a:latin typeface="Consolas" panose="020B0609020204030204" pitchFamily="49" charset="0"/>
+                </a:rPr>
+                <a:t> </a:t>
+              </a:r>
+              <a:r>
+                <a:rPr lang="en-US" b="1" dirty="0" smtClean="0">
+                  <a:solidFill>
+                    <a:schemeClr val="bg1"/>
+                  </a:solidFill>
+                  <a:latin typeface="Consolas" panose="020B0609020204030204" pitchFamily="49" charset="0"/>
+                </a:rPr>
+                <a:t>t1 </a:t>
+              </a:r>
+              <a:r>
+                <a:rPr lang="en-US" b="1" dirty="0">
+                  <a:solidFill>
+                    <a:srgbClr val="CC7833"/>
+                  </a:solidFill>
+                  <a:latin typeface="Consolas" panose="020B0609020204030204" pitchFamily="49" charset="0"/>
+                </a:rPr>
+                <a:t>=</a:t>
+              </a:r>
+              <a:r>
+                <a:rPr lang="en-US" b="1" dirty="0">
+                  <a:solidFill>
+                    <a:schemeClr val="bg1"/>
+                  </a:solidFill>
+                  <a:latin typeface="Consolas" panose="020B0609020204030204" pitchFamily="49" charset="0"/>
+                </a:rPr>
+                <a:t> </a:t>
+              </a:r>
+              <a:r>
+                <a:rPr lang="en-US" b="1" dirty="0" smtClean="0">
+                  <a:solidFill>
+                    <a:schemeClr val="bg1"/>
+                  </a:solidFill>
+                  <a:latin typeface="Consolas" panose="020B0609020204030204" pitchFamily="49" charset="0"/>
+                </a:rPr>
+                <a:t>(</a:t>
+              </a:r>
+              <a:r>
+                <a:rPr lang="en-US" b="1" dirty="0" smtClean="0">
+                  <a:solidFill>
+                    <a:srgbClr val="6C99BB"/>
+                  </a:solidFill>
+                  <a:latin typeface="Consolas" panose="020B0609020204030204" pitchFamily="49" charset="0"/>
+                </a:rPr>
+                <a:t>true</a:t>
+              </a:r>
+              <a:r>
+                <a:rPr lang="en-US" b="1" dirty="0" smtClean="0">
+                  <a:solidFill>
+                    <a:schemeClr val="bg1"/>
+                  </a:solidFill>
+                  <a:latin typeface="Consolas" panose="020B0609020204030204" pitchFamily="49" charset="0"/>
+                </a:rPr>
+                <a:t>,</a:t>
+              </a:r>
+              <a:r>
+                <a:rPr lang="en-US" b="1" dirty="0" smtClean="0">
+                  <a:solidFill>
+                    <a:srgbClr val="6C99BB"/>
+                  </a:solidFill>
+                  <a:latin typeface="Consolas" panose="020B0609020204030204" pitchFamily="49" charset="0"/>
+                </a:rPr>
+                <a:t> false</a:t>
+              </a:r>
+              <a:r>
+                <a:rPr lang="en-US" b="1" dirty="0" smtClean="0">
+                  <a:solidFill>
+                    <a:schemeClr val="bg1"/>
+                  </a:solidFill>
+                  <a:latin typeface="Consolas" panose="020B0609020204030204" pitchFamily="49" charset="0"/>
+                </a:rPr>
+                <a:t>)</a:t>
+              </a:r>
+              <a:r>
+                <a:rPr lang="en-US" b="1" dirty="0" smtClean="0">
+                  <a:solidFill>
+                    <a:srgbClr val="6C99BB"/>
+                  </a:solidFill>
+                  <a:latin typeface="Consolas" panose="020B0609020204030204" pitchFamily="49" charset="0"/>
+                </a:rPr>
+                <a:t>           </a:t>
+              </a:r>
+              <a:r>
+                <a:rPr lang="en-US" b="1" dirty="0" smtClean="0">
+                  <a:solidFill>
+                    <a:srgbClr val="BC9457"/>
+                  </a:solidFill>
+                  <a:latin typeface="Consolas" panose="020B0609020204030204" pitchFamily="49" charset="0"/>
+                </a:rPr>
+                <a:t>// : (Boolean, Boolean)</a:t>
+              </a:r>
+            </a:p>
+            <a:p>
+              <a:endParaRPr lang="en-US" b="1" dirty="0" smtClean="0">
+                <a:solidFill>
+                  <a:srgbClr val="BC9457"/>
+                </a:solidFill>
+                <a:latin typeface="Consolas" panose="020B0609020204030204" pitchFamily="49" charset="0"/>
+              </a:endParaRPr>
+            </a:p>
+            <a:p>
+              <a:r>
+                <a:rPr lang="en-US" b="1" dirty="0" err="1">
+                  <a:solidFill>
+                    <a:srgbClr val="CC7833"/>
+                  </a:solidFill>
+                  <a:latin typeface="Consolas" panose="020B0609020204030204" pitchFamily="49" charset="0"/>
+                </a:rPr>
+                <a:t>val</a:t>
+              </a:r>
+              <a:r>
+                <a:rPr lang="en-US" b="1" dirty="0">
+                  <a:solidFill>
+                    <a:schemeClr val="bg1"/>
+                  </a:solidFill>
+                  <a:latin typeface="Consolas" panose="020B0609020204030204" pitchFamily="49" charset="0"/>
+                </a:rPr>
+                <a:t> </a:t>
+              </a:r>
+              <a:r>
+                <a:rPr lang="en-US" b="1" dirty="0" smtClean="0">
+                  <a:solidFill>
+                    <a:schemeClr val="bg1"/>
+                  </a:solidFill>
+                  <a:latin typeface="Consolas" panose="020B0609020204030204" pitchFamily="49" charset="0"/>
+                </a:rPr>
+                <a:t>t2 </a:t>
+              </a:r>
+              <a:r>
+                <a:rPr lang="en-US" b="1" dirty="0">
+                  <a:solidFill>
+                    <a:srgbClr val="CC7833"/>
+                  </a:solidFill>
+                  <a:latin typeface="Consolas" panose="020B0609020204030204" pitchFamily="49" charset="0"/>
+                </a:rPr>
+                <a:t>=</a:t>
+              </a:r>
+              <a:r>
+                <a:rPr lang="en-US" b="1" dirty="0">
+                  <a:solidFill>
+                    <a:schemeClr val="bg1"/>
+                  </a:solidFill>
+                  <a:latin typeface="Consolas" panose="020B0609020204030204" pitchFamily="49" charset="0"/>
+                </a:rPr>
+                <a:t> (</a:t>
+              </a:r>
+              <a:r>
+                <a:rPr lang="en-US" b="1" dirty="0">
+                  <a:solidFill>
+                    <a:srgbClr val="6C99BB"/>
+                  </a:solidFill>
+                  <a:latin typeface="Consolas" panose="020B0609020204030204" pitchFamily="49" charset="0"/>
+                </a:rPr>
+                <a:t>true</a:t>
+              </a:r>
+              <a:r>
+                <a:rPr lang="en-US" b="1" dirty="0">
+                  <a:solidFill>
+                    <a:schemeClr val="bg1"/>
+                  </a:solidFill>
+                  <a:latin typeface="Consolas" panose="020B0609020204030204" pitchFamily="49" charset="0"/>
+                </a:rPr>
+                <a:t>,</a:t>
+              </a:r>
+              <a:r>
+                <a:rPr lang="en-US" b="1" dirty="0">
+                  <a:solidFill>
+                    <a:srgbClr val="6C99BB"/>
+                  </a:solidFill>
+                  <a:latin typeface="Consolas" panose="020B0609020204030204" pitchFamily="49" charset="0"/>
+                </a:rPr>
+                <a:t> </a:t>
+              </a:r>
+              <a:r>
+                <a:rPr lang="en-US" b="1" dirty="0" smtClean="0">
+                  <a:solidFill>
+                    <a:srgbClr val="6C99BB"/>
+                  </a:solidFill>
+                  <a:latin typeface="Consolas" panose="020B0609020204030204" pitchFamily="49" charset="0"/>
+                </a:rPr>
+                <a:t>false</a:t>
+              </a:r>
+              <a:r>
+                <a:rPr lang="en-US" b="1" dirty="0" smtClean="0">
+                  <a:solidFill>
+                    <a:schemeClr val="bg1"/>
+                  </a:solidFill>
+                  <a:latin typeface="Consolas" panose="020B0609020204030204" pitchFamily="49" charset="0"/>
+                </a:rPr>
+                <a:t>,</a:t>
+              </a:r>
+              <a:r>
+                <a:rPr lang="en-US" b="1" dirty="0" smtClean="0">
+                  <a:solidFill>
+                    <a:srgbClr val="6C99BB"/>
+                  </a:solidFill>
+                  <a:latin typeface="Consolas" panose="020B0609020204030204" pitchFamily="49" charset="0"/>
+                </a:rPr>
+                <a:t> false</a:t>
+              </a:r>
+              <a:r>
+                <a:rPr lang="en-US" b="1" dirty="0" smtClean="0">
+                  <a:solidFill>
+                    <a:schemeClr val="bg1"/>
+                  </a:solidFill>
+                  <a:latin typeface="Consolas" panose="020B0609020204030204" pitchFamily="49" charset="0"/>
+                </a:rPr>
+                <a:t>)</a:t>
+              </a:r>
+              <a:r>
+                <a:rPr lang="en-US" b="1" dirty="0" smtClean="0">
+                  <a:solidFill>
+                    <a:srgbClr val="6C99BB"/>
+                  </a:solidFill>
+                  <a:latin typeface="Consolas" panose="020B0609020204030204" pitchFamily="49" charset="0"/>
+                </a:rPr>
+                <a:t>    </a:t>
+              </a:r>
+              <a:r>
+                <a:rPr lang="en-US" b="1" dirty="0" smtClean="0">
+                  <a:solidFill>
+                    <a:srgbClr val="BC9457"/>
+                  </a:solidFill>
+                  <a:latin typeface="Consolas" panose="020B0609020204030204" pitchFamily="49" charset="0"/>
+                </a:rPr>
+                <a:t>// </a:t>
+              </a:r>
+              <a:r>
+                <a:rPr lang="en-US" b="1" dirty="0">
+                  <a:solidFill>
+                    <a:srgbClr val="BC9457"/>
+                  </a:solidFill>
+                  <a:latin typeface="Consolas" panose="020B0609020204030204" pitchFamily="49" charset="0"/>
+                </a:rPr>
+                <a:t>: (Boolean, </a:t>
+              </a:r>
+              <a:r>
+                <a:rPr lang="en-US" b="1" dirty="0" smtClean="0">
+                  <a:solidFill>
+                    <a:srgbClr val="BC9457"/>
+                  </a:solidFill>
+                  <a:latin typeface="Consolas" panose="020B0609020204030204" pitchFamily="49" charset="0"/>
+                </a:rPr>
+                <a:t>Boolean, Boolean)</a:t>
+              </a:r>
+              <a:endParaRPr lang="en-US" b="1" dirty="0">
+                <a:solidFill>
+                  <a:srgbClr val="BC9457"/>
+                </a:solidFill>
+                <a:latin typeface="Consolas" panose="020B0609020204030204" pitchFamily="49" charset="0"/>
+              </a:endParaRPr>
+            </a:p>
+            <a:p>
+              <a:endParaRPr lang="en-US" b="1" dirty="0" smtClean="0">
+                <a:solidFill>
+                  <a:srgbClr val="BC9457"/>
+                </a:solidFill>
+                <a:latin typeface="Consolas" panose="020B0609020204030204" pitchFamily="49" charset="0"/>
+              </a:endParaRPr>
+            </a:p>
+            <a:p>
+              <a:r>
+                <a:rPr lang="en-US" b="1" dirty="0" err="1">
+                  <a:solidFill>
+                    <a:srgbClr val="CC7833"/>
+                  </a:solidFill>
+                  <a:latin typeface="Consolas" panose="020B0609020204030204" pitchFamily="49" charset="0"/>
+                </a:rPr>
+                <a:t>val</a:t>
+              </a:r>
+              <a:r>
+                <a:rPr lang="en-US" b="1" dirty="0">
+                  <a:solidFill>
+                    <a:schemeClr val="bg1"/>
+                  </a:solidFill>
+                  <a:latin typeface="Consolas" panose="020B0609020204030204" pitchFamily="49" charset="0"/>
+                </a:rPr>
+                <a:t> </a:t>
+              </a:r>
+              <a:r>
+                <a:rPr lang="en-US" b="1" dirty="0" smtClean="0">
+                  <a:solidFill>
+                    <a:schemeClr val="bg1"/>
+                  </a:solidFill>
+                  <a:latin typeface="Consolas" panose="020B0609020204030204" pitchFamily="49" charset="0"/>
+                </a:rPr>
+                <a:t>t3 </a:t>
+              </a:r>
+              <a:r>
+                <a:rPr lang="en-US" b="1" dirty="0">
+                  <a:solidFill>
+                    <a:srgbClr val="CC7833"/>
+                  </a:solidFill>
+                  <a:latin typeface="Consolas" panose="020B0609020204030204" pitchFamily="49" charset="0"/>
+                </a:rPr>
+                <a:t>=</a:t>
+              </a:r>
+              <a:r>
+                <a:rPr lang="en-US" b="1" dirty="0">
+                  <a:solidFill>
+                    <a:schemeClr val="bg1"/>
+                  </a:solidFill>
+                  <a:latin typeface="Consolas" panose="020B0609020204030204" pitchFamily="49" charset="0"/>
+                </a:rPr>
+                <a:t> </a:t>
+              </a:r>
+              <a:r>
+                <a:rPr lang="en-US" b="1" dirty="0" smtClean="0">
+                  <a:solidFill>
+                    <a:schemeClr val="bg1"/>
+                  </a:solidFill>
+                  <a:latin typeface="Consolas" panose="020B0609020204030204" pitchFamily="49" charset="0"/>
+                </a:rPr>
+                <a:t>(</a:t>
+              </a:r>
+              <a:r>
+                <a:rPr lang="en-US" b="1" dirty="0" smtClean="0">
+                  <a:solidFill>
+                    <a:srgbClr val="6C99BB"/>
+                  </a:solidFill>
+                  <a:latin typeface="Consolas" panose="020B0609020204030204" pitchFamily="49" charset="0"/>
+                </a:rPr>
+                <a:t>1.0</a:t>
+              </a:r>
+              <a:r>
+                <a:rPr lang="en-US" b="1" dirty="0" smtClean="0">
+                  <a:solidFill>
+                    <a:schemeClr val="bg1"/>
+                  </a:solidFill>
+                  <a:latin typeface="Consolas" panose="020B0609020204030204" pitchFamily="49" charset="0"/>
+                </a:rPr>
+                <a:t>,</a:t>
+              </a:r>
+              <a:r>
+                <a:rPr lang="en-US" b="1" dirty="0" smtClean="0">
+                  <a:solidFill>
+                    <a:srgbClr val="6C99BB"/>
+                  </a:solidFill>
+                  <a:latin typeface="Consolas" panose="020B0609020204030204" pitchFamily="49" charset="0"/>
+                </a:rPr>
+                <a:t> </a:t>
+              </a:r>
+              <a:r>
+                <a:rPr lang="en-US" b="1" dirty="0" smtClean="0">
+                  <a:solidFill>
+                    <a:srgbClr val="A5C261"/>
+                  </a:solidFill>
+                  <a:latin typeface="Consolas" panose="020B0609020204030204" pitchFamily="49" charset="0"/>
+                </a:rPr>
+                <a:t>"</a:t>
+              </a:r>
+              <a:r>
+                <a:rPr lang="en-US" b="1" dirty="0" err="1" smtClean="0">
+                  <a:solidFill>
+                    <a:srgbClr val="A5C261"/>
+                  </a:solidFill>
+                  <a:latin typeface="Consolas" panose="020B0609020204030204" pitchFamily="49" charset="0"/>
+                </a:rPr>
+                <a:t>abc</a:t>
+              </a:r>
+              <a:r>
+                <a:rPr lang="en-US" b="1" dirty="0" smtClean="0">
+                  <a:solidFill>
+                    <a:srgbClr val="A5C261"/>
+                  </a:solidFill>
+                  <a:latin typeface="Consolas" panose="020B0609020204030204" pitchFamily="49" charset="0"/>
+                </a:rPr>
+                <a:t>"</a:t>
+              </a:r>
+              <a:r>
+                <a:rPr lang="en-US" b="1" dirty="0" smtClean="0">
+                  <a:solidFill>
+                    <a:schemeClr val="bg1"/>
+                  </a:solidFill>
+                  <a:latin typeface="Consolas" panose="020B0609020204030204" pitchFamily="49" charset="0"/>
+                </a:rPr>
+                <a:t>)</a:t>
+              </a:r>
+              <a:r>
+                <a:rPr lang="en-US" b="1" dirty="0" smtClean="0">
+                  <a:solidFill>
+                    <a:srgbClr val="6C99BB"/>
+                  </a:solidFill>
+                  <a:latin typeface="Consolas" panose="020B0609020204030204" pitchFamily="49" charset="0"/>
+                </a:rPr>
+                <a:t>            </a:t>
+              </a:r>
+              <a:r>
+                <a:rPr lang="en-US" b="1" dirty="0" smtClean="0">
+                  <a:solidFill>
+                    <a:srgbClr val="BC9457"/>
+                  </a:solidFill>
+                  <a:latin typeface="Consolas" panose="020B0609020204030204" pitchFamily="49" charset="0"/>
+                </a:rPr>
+                <a:t>// </a:t>
+              </a:r>
+              <a:r>
+                <a:rPr lang="en-US" b="1" dirty="0">
+                  <a:solidFill>
+                    <a:srgbClr val="BC9457"/>
+                  </a:solidFill>
+                  <a:latin typeface="Consolas" panose="020B0609020204030204" pitchFamily="49" charset="0"/>
+                </a:rPr>
+                <a:t>: </a:t>
+              </a:r>
+              <a:r>
+                <a:rPr lang="en-US" b="1" dirty="0" smtClean="0">
+                  <a:solidFill>
+                    <a:srgbClr val="BC9457"/>
+                  </a:solidFill>
+                  <a:latin typeface="Consolas" panose="020B0609020204030204" pitchFamily="49" charset="0"/>
+                </a:rPr>
+                <a:t>(Double, String)</a:t>
+              </a:r>
+              <a:endParaRPr lang="en-US" b="1" dirty="0">
+                <a:solidFill>
+                  <a:srgbClr val="BC9457"/>
+                </a:solidFill>
+                <a:latin typeface="Consolas" panose="020B0609020204030204" pitchFamily="49" charset="0"/>
+              </a:endParaRPr>
+            </a:p>
+            <a:p>
+              <a:endParaRPr lang="en-US" b="1" dirty="0" smtClean="0">
+                <a:solidFill>
+                  <a:srgbClr val="BC9457"/>
+                </a:solidFill>
+                <a:latin typeface="Consolas" panose="020B0609020204030204" pitchFamily="49" charset="0"/>
+              </a:endParaRPr>
+            </a:p>
+            <a:p>
+              <a:r>
+                <a:rPr lang="en-US" b="1" dirty="0" err="1">
+                  <a:solidFill>
+                    <a:srgbClr val="CC7833"/>
+                  </a:solidFill>
+                  <a:latin typeface="Consolas" panose="020B0609020204030204" pitchFamily="49" charset="0"/>
+                </a:rPr>
+                <a:t>val</a:t>
+              </a:r>
+              <a:r>
+                <a:rPr lang="en-US" b="1" dirty="0">
+                  <a:solidFill>
+                    <a:schemeClr val="bg1"/>
+                  </a:solidFill>
+                  <a:latin typeface="Consolas" panose="020B0609020204030204" pitchFamily="49" charset="0"/>
+                </a:rPr>
+                <a:t> </a:t>
+              </a:r>
+              <a:r>
+                <a:rPr lang="en-US" b="1" dirty="0" smtClean="0">
+                  <a:solidFill>
+                    <a:schemeClr val="bg1"/>
+                  </a:solidFill>
+                  <a:latin typeface="Consolas" panose="020B0609020204030204" pitchFamily="49" charset="0"/>
+                </a:rPr>
+                <a:t>t4 </a:t>
+              </a:r>
+              <a:r>
+                <a:rPr lang="en-US" b="1" dirty="0">
+                  <a:solidFill>
+                    <a:srgbClr val="CC7833"/>
+                  </a:solidFill>
+                  <a:latin typeface="Consolas" panose="020B0609020204030204" pitchFamily="49" charset="0"/>
+                </a:rPr>
+                <a:t>=</a:t>
+              </a:r>
+              <a:r>
+                <a:rPr lang="en-US" b="1" dirty="0">
+                  <a:solidFill>
+                    <a:schemeClr val="bg1"/>
+                  </a:solidFill>
+                  <a:latin typeface="Consolas" panose="020B0609020204030204" pitchFamily="49" charset="0"/>
+                </a:rPr>
+                <a:t> </a:t>
+              </a:r>
+              <a:r>
+                <a:rPr lang="en-US" b="1" dirty="0" smtClean="0">
+                  <a:solidFill>
+                    <a:schemeClr val="bg1"/>
+                  </a:solidFill>
+                  <a:latin typeface="Consolas" panose="020B0609020204030204" pitchFamily="49" charset="0"/>
+                </a:rPr>
+                <a:t>(</a:t>
+              </a:r>
+              <a:r>
+                <a:rPr lang="en-US" b="1" dirty="0" smtClean="0">
+                  <a:solidFill>
+                    <a:srgbClr val="A5C261"/>
+                  </a:solidFill>
+                  <a:latin typeface="Consolas" panose="020B0609020204030204" pitchFamily="49" charset="0"/>
+                </a:rPr>
+                <a:t>"</a:t>
+              </a:r>
+              <a:r>
+                <a:rPr lang="en-US" b="1" dirty="0" err="1" smtClean="0">
+                  <a:solidFill>
+                    <a:srgbClr val="A5C261"/>
+                  </a:solidFill>
+                  <a:latin typeface="Consolas" panose="020B0609020204030204" pitchFamily="49" charset="0"/>
+                </a:rPr>
+                <a:t>def</a:t>
+              </a:r>
+              <a:r>
+                <a:rPr lang="en-US" b="1" dirty="0" smtClean="0">
+                  <a:solidFill>
+                    <a:srgbClr val="A5C261"/>
+                  </a:solidFill>
+                  <a:latin typeface="Consolas" panose="020B0609020204030204" pitchFamily="49" charset="0"/>
+                </a:rPr>
+                <a:t>"</a:t>
+              </a:r>
+              <a:r>
+                <a:rPr lang="en-US" b="1" dirty="0" smtClean="0">
+                  <a:solidFill>
+                    <a:schemeClr val="bg1"/>
+                  </a:solidFill>
+                  <a:latin typeface="Consolas" panose="020B0609020204030204" pitchFamily="49" charset="0"/>
+                </a:rPr>
+                <a:t>, List(</a:t>
+              </a:r>
+              <a:r>
+                <a:rPr lang="en-US" b="1" dirty="0" smtClean="0">
+                  <a:solidFill>
+                    <a:srgbClr val="6C99BB"/>
+                  </a:solidFill>
+                  <a:latin typeface="Consolas" panose="020B0609020204030204" pitchFamily="49" charset="0"/>
+                </a:rPr>
+                <a:t>1</a:t>
+              </a:r>
+              <a:r>
+                <a:rPr lang="en-US" b="1" dirty="0" smtClean="0">
+                  <a:solidFill>
+                    <a:schemeClr val="bg1"/>
+                  </a:solidFill>
+                  <a:latin typeface="Consolas" panose="020B0609020204030204" pitchFamily="49" charset="0"/>
+                </a:rPr>
+                <a:t>, </a:t>
+              </a:r>
+              <a:r>
+                <a:rPr lang="en-US" b="1" dirty="0" smtClean="0">
+                  <a:solidFill>
+                    <a:srgbClr val="6C99BB"/>
+                  </a:solidFill>
+                  <a:latin typeface="Consolas" panose="020B0609020204030204" pitchFamily="49" charset="0"/>
+                </a:rPr>
+                <a:t>2</a:t>
+              </a:r>
+              <a:r>
+                <a:rPr lang="en-US" b="1" dirty="0" smtClean="0">
+                  <a:solidFill>
+                    <a:schemeClr val="bg1"/>
+                  </a:solidFill>
+                  <a:latin typeface="Consolas" panose="020B0609020204030204" pitchFamily="49" charset="0"/>
+                </a:rPr>
+                <a:t>, </a:t>
+              </a:r>
+              <a:r>
+                <a:rPr lang="en-US" b="1" dirty="0" smtClean="0">
+                  <a:solidFill>
+                    <a:srgbClr val="6C99BB"/>
+                  </a:solidFill>
+                  <a:latin typeface="Consolas" panose="020B0609020204030204" pitchFamily="49" charset="0"/>
+                </a:rPr>
+                <a:t>3</a:t>
+              </a:r>
+              <a:r>
+                <a:rPr lang="en-US" b="1" dirty="0" smtClean="0">
+                  <a:solidFill>
+                    <a:schemeClr val="bg1"/>
+                  </a:solidFill>
+                  <a:latin typeface="Consolas" panose="020B0609020204030204" pitchFamily="49" charset="0"/>
+                </a:rPr>
+                <a:t>), (</a:t>
+              </a:r>
+              <a:r>
+                <a:rPr lang="en-US" b="1" dirty="0" smtClean="0">
+                  <a:solidFill>
+                    <a:srgbClr val="6C99BB"/>
+                  </a:solidFill>
+                  <a:latin typeface="Consolas" panose="020B0609020204030204" pitchFamily="49" charset="0"/>
+                </a:rPr>
+                <a:t>3.14</a:t>
+              </a:r>
+              <a:r>
+                <a:rPr lang="en-US" b="1" dirty="0" smtClean="0">
+                  <a:solidFill>
+                    <a:schemeClr val="bg1"/>
+                  </a:solidFill>
+                  <a:latin typeface="Consolas" panose="020B0609020204030204" pitchFamily="49" charset="0"/>
+                </a:rPr>
+                <a:t>, </a:t>
+              </a:r>
+              <a:r>
+                <a:rPr lang="en-US" b="1" dirty="0" smtClean="0">
+                  <a:solidFill>
+                    <a:srgbClr val="A5C261"/>
+                  </a:solidFill>
+                  <a:latin typeface="Consolas" panose="020B0609020204030204" pitchFamily="49" charset="0"/>
+                </a:rPr>
+                <a:t>"1.4142"</a:t>
+              </a:r>
+              <a:r>
+                <a:rPr lang="en-US" b="1" dirty="0" smtClean="0">
+                  <a:solidFill>
+                    <a:schemeClr val="bg1"/>
+                  </a:solidFill>
+                  <a:latin typeface="Consolas" panose="020B0609020204030204" pitchFamily="49" charset="0"/>
+                </a:rPr>
+                <a:t>))</a:t>
+              </a:r>
+            </a:p>
+            <a:p>
+              <a:r>
+                <a:rPr lang="en-US" b="1" dirty="0" smtClean="0">
+                  <a:solidFill>
+                    <a:srgbClr val="6C99BB"/>
+                  </a:solidFill>
+                  <a:latin typeface="Consolas" panose="020B0609020204030204" pitchFamily="49" charset="0"/>
+                </a:rPr>
+                <a:t>                         </a:t>
+              </a:r>
+              <a:r>
+                <a:rPr lang="en-US" b="1" dirty="0" smtClean="0">
+                  <a:solidFill>
+                    <a:srgbClr val="BC9457"/>
+                  </a:solidFill>
+                  <a:latin typeface="Consolas" panose="020B0609020204030204" pitchFamily="49" charset="0"/>
+                </a:rPr>
+                <a:t>// </a:t>
+              </a:r>
+              <a:r>
+                <a:rPr lang="en-US" b="1" dirty="0">
+                  <a:solidFill>
+                    <a:srgbClr val="BC9457"/>
+                  </a:solidFill>
+                  <a:latin typeface="Consolas" panose="020B0609020204030204" pitchFamily="49" charset="0"/>
+                </a:rPr>
+                <a:t>: </a:t>
+              </a:r>
+              <a:r>
+                <a:rPr lang="en-US" b="1" dirty="0" smtClean="0">
+                  <a:solidFill>
+                    <a:srgbClr val="BC9457"/>
+                  </a:solidFill>
+                  <a:latin typeface="Consolas" panose="020B0609020204030204" pitchFamily="49" charset="0"/>
+                </a:rPr>
+                <a:t>(String, List[</a:t>
+              </a:r>
+              <a:r>
+                <a:rPr lang="en-US" b="1" dirty="0" err="1" smtClean="0">
+                  <a:solidFill>
+                    <a:srgbClr val="BC9457"/>
+                  </a:solidFill>
+                  <a:latin typeface="Consolas" panose="020B0609020204030204" pitchFamily="49" charset="0"/>
+                </a:rPr>
+                <a:t>Int</a:t>
+              </a:r>
+              <a:r>
+                <a:rPr lang="en-US" b="1" dirty="0" smtClean="0">
+                  <a:solidFill>
+                    <a:srgbClr val="BC9457"/>
+                  </a:solidFill>
+                  <a:latin typeface="Consolas" panose="020B0609020204030204" pitchFamily="49" charset="0"/>
+                </a:rPr>
+                <a:t>], (Double, String))</a:t>
+              </a:r>
+            </a:p>
+            <a:p>
+              <a:endParaRPr lang="en-US" b="1" dirty="0">
+                <a:solidFill>
+                  <a:srgbClr val="BC9457"/>
+                </a:solidFill>
+                <a:latin typeface="Consolas" panose="020B0609020204030204" pitchFamily="49" charset="0"/>
+              </a:endParaRPr>
+            </a:p>
+            <a:p>
+              <a:r>
+                <a:rPr lang="en-US" b="1" dirty="0" err="1">
+                  <a:solidFill>
+                    <a:srgbClr val="CC7833"/>
+                  </a:solidFill>
+                  <a:latin typeface="Consolas" panose="020B0609020204030204" pitchFamily="49" charset="0"/>
+                </a:rPr>
+                <a:t>val</a:t>
+              </a:r>
+              <a:r>
+                <a:rPr lang="en-US" b="1" dirty="0" smtClean="0">
+                  <a:solidFill>
+                    <a:schemeClr val="bg1"/>
+                  </a:solidFill>
+                  <a:latin typeface="Consolas" panose="020B0609020204030204" pitchFamily="49" charset="0"/>
+                </a:rPr>
+                <a:t> a  </a:t>
+              </a:r>
+              <a:r>
+                <a:rPr lang="en-US" b="1" dirty="0" smtClean="0">
+                  <a:solidFill>
+                    <a:srgbClr val="CC7833"/>
+                  </a:solidFill>
+                  <a:latin typeface="Consolas" panose="020B0609020204030204" pitchFamily="49" charset="0"/>
+                </a:rPr>
+                <a:t>=</a:t>
+              </a:r>
+              <a:r>
+                <a:rPr lang="en-US" b="1" dirty="0" smtClean="0">
+                  <a:solidFill>
+                    <a:schemeClr val="bg1"/>
+                  </a:solidFill>
+                  <a:latin typeface="Consolas" panose="020B0609020204030204" pitchFamily="49" charset="0"/>
+                </a:rPr>
+                <a:t> t3._1</a:t>
+              </a:r>
+            </a:p>
+            <a:p>
+              <a:r>
+                <a:rPr lang="en-US" b="1" dirty="0" err="1">
+                  <a:solidFill>
+                    <a:srgbClr val="CC7833"/>
+                  </a:solidFill>
+                  <a:latin typeface="Consolas" panose="020B0609020204030204" pitchFamily="49" charset="0"/>
+                </a:rPr>
+                <a:t>val</a:t>
+              </a:r>
+              <a:r>
+                <a:rPr lang="en-US" b="1" dirty="0" smtClean="0">
+                  <a:solidFill>
+                    <a:schemeClr val="bg1"/>
+                  </a:solidFill>
+                  <a:latin typeface="Consolas" panose="020B0609020204030204" pitchFamily="49" charset="0"/>
+                </a:rPr>
+                <a:t> b  </a:t>
+              </a:r>
+              <a:r>
+                <a:rPr lang="en-US" b="1" dirty="0" smtClean="0">
+                  <a:solidFill>
+                    <a:srgbClr val="CC7833"/>
+                  </a:solidFill>
+                  <a:latin typeface="Consolas" panose="020B0609020204030204" pitchFamily="49" charset="0"/>
+                </a:rPr>
+                <a:t>=</a:t>
+              </a:r>
+              <a:r>
+                <a:rPr lang="en-US" b="1" dirty="0" smtClean="0">
+                  <a:solidFill>
+                    <a:schemeClr val="bg1"/>
+                  </a:solidFill>
+                  <a:latin typeface="Consolas" panose="020B0609020204030204" pitchFamily="49" charset="0"/>
+                </a:rPr>
+                <a:t> t3._2</a:t>
+              </a:r>
+            </a:p>
+            <a:p>
+              <a:r>
+                <a:rPr lang="en-US" b="1" dirty="0" err="1">
+                  <a:solidFill>
+                    <a:srgbClr val="CC7833"/>
+                  </a:solidFill>
+                  <a:latin typeface="Consolas" panose="020B0609020204030204" pitchFamily="49" charset="0"/>
+                </a:rPr>
+                <a:t>val</a:t>
+              </a:r>
+              <a:r>
+                <a:rPr lang="en-US" b="1" dirty="0" smtClean="0">
+                  <a:solidFill>
+                    <a:schemeClr val="bg1"/>
+                  </a:solidFill>
+                  <a:latin typeface="Consolas" panose="020B0609020204030204" pitchFamily="49" charset="0"/>
+                </a:rPr>
+                <a:t> pi </a:t>
+              </a:r>
+              <a:r>
+                <a:rPr lang="en-US" b="1" dirty="0" smtClean="0">
+                  <a:solidFill>
+                    <a:srgbClr val="CC7833"/>
+                  </a:solidFill>
+                  <a:latin typeface="Consolas" panose="020B0609020204030204" pitchFamily="49" charset="0"/>
+                </a:rPr>
+                <a:t>=</a:t>
+              </a:r>
+              <a:r>
+                <a:rPr lang="en-US" b="1" dirty="0" smtClean="0">
+                  <a:solidFill>
+                    <a:schemeClr val="bg1"/>
+                  </a:solidFill>
+                  <a:latin typeface="Consolas" panose="020B0609020204030204" pitchFamily="49" charset="0"/>
+                </a:rPr>
+                <a:t> t4._3._1</a:t>
+              </a:r>
+              <a:endParaRPr lang="en-US" b="1" dirty="0">
+                <a:solidFill>
+                  <a:srgbClr val="BC9457"/>
+                </a:solidFill>
+                <a:latin typeface="Consolas" panose="020B0609020204030204" pitchFamily="49" charset="0"/>
+              </a:endParaRPr>
+            </a:p>
+          </p:txBody>
+        </p:sp>
+        <p:pic>
+          <p:nvPicPr>
+            <p:cNvPr id="7" name="Picture 2" descr="https://upload.wikimedia.org/wikipedia/commons/thumb/3/39/Scala-full-color.svg/2560px-Scala-full-color.svg.png"/>
+            <p:cNvPicPr>
+              <a:picLocks noChangeAspect="1" noChangeArrowheads="1"/>
+            </p:cNvPicPr>
+            <p:nvPr/>
+          </p:nvPicPr>
+          <p:blipFill rotWithShape="1">
+            <a:blip r:embed="rId2" cstate="print">
+              <a:extLst>
+                <a:ext uri="{28A0092B-C50C-407E-A947-70E740481C1C}">
+                  <a14:useLocalDpi xmlns:a14="http://schemas.microsoft.com/office/drawing/2010/main" val="0"/>
+                </a:ext>
+              </a:extLst>
+            </a:blip>
+            <a:srcRect l="3027" r="68307" b="11780"/>
+            <a:stretch/>
+          </p:blipFill>
+          <p:spPr bwMode="auto">
+            <a:xfrm>
+              <a:off x="8325632" y="3903898"/>
+              <a:ext cx="638856" cy="900100"/>
+            </a:xfrm>
+            <a:prstGeom prst="rect">
+              <a:avLst/>
+            </a:prstGeom>
+            <a:noFill/>
+            <a:extLst>
+              <a:ext uri="{909E8E84-426E-40DD-AFC4-6F175D3DCCD1}">
+                <a14:hiddenFill xmlns:a14="http://schemas.microsoft.com/office/drawing/2010/main">
+                  <a:solidFill>
+                    <a:srgbClr val="FFFFFF"/>
+                  </a:solidFill>
+                </a14:hiddenFill>
+              </a:ext>
+            </a:extLst>
+          </p:spPr>
+        </p:pic>
+      </p:grpSp>
+    </p:spTree>
+    <p:extLst>
+      <p:ext uri="{BB962C8B-B14F-4D97-AF65-F5344CB8AC3E}">
+        <p14:creationId xmlns:p14="http://schemas.microsoft.com/office/powerpoint/2010/main" val="3423390035"/>
+      </p:ext>
+    </p:extLst>
+  </p:cSld>
+  <p:clrMapOvr>
+    <a:masterClrMapping/>
+  </p:clrMapOvr>
+  <mc:AlternateContent xmlns:mc="http://schemas.openxmlformats.org/markup-compatibility/2006">
+    <mc:Choice xmlns:p14="http://schemas.microsoft.com/office/powerpoint/2010/main" Requires="p14">
+      <p:transition spd="slow" p14:dur="2000" advClick="0" advTm="1000"/>
+    </mc:Choice>
+    <mc:Fallback>
+      <p:transition spd="slow" advClick="0" advTm="1000"/>
+    </mc:Fallback>
+  </mc:AlternateContent>
+  <p:timing>
+    <p:tnLst>
+      <p:par>
         <p:cTn id="1" dur="indefinite" restart="never" nodeType="tmRoot">
           <p:childTnLst>
             <p:seq concurrent="1" nextAc="seek">
@@ -4937,6 +6071,9 @@
                     <p:cTn id="3" fill="hold">
                       <p:stCondLst>
                         <p:cond delay="indefinite"/>
+                        <p:cond evt="onBegin" delay="0">
+                          <p:tn val="2"/>
+                        </p:cond>
                       </p:stCondLst>
                       <p:childTnLst>
                         <p:par>
@@ -4946,7 +6083,7 @@
                             </p:stCondLst>
                             <p:childTnLst>
                               <p:par>
-                                <p:cTn id="5" presetID="2" presetClass="exit" presetSubtype="1" fill="hold" nodeType="clickEffect">
+                                <p:cTn id="5" presetID="2" presetClass="exit" presetSubtype="1" fill="hold" nodeType="withEffect">
                                   <p:stCondLst>
                                     <p:cond delay="0"/>
                                   </p:stCondLst>
@@ -5049,7 +6186,7 @@
 </p:sld>
 </file>
 
-<file path=ppt/slides/slide11.xml><?xml version="1.0" encoding="utf-8"?>
+<file path=ppt/slides/slide12.xml><?xml version="1.0" encoding="utf-8"?>
 <p:sld xmlns:a="http://schemas.openxmlformats.org/drawingml/2006/main" xmlns:r="http://schemas.openxmlformats.org/officeDocument/2006/relationships" xmlns:p="http://schemas.openxmlformats.org/presentationml/2006/main">
   <p:cSld>
     <p:spTree>
@@ -5236,7 +6373,7 @@
 </p:sld>
 </file>
 
-<file path=ppt/slides/slide12.xml><?xml version="1.0" encoding="utf-8"?>
+<file path=ppt/slides/slide13.xml><?xml version="1.0" encoding="utf-8"?>
 <p:sld xmlns:a="http://schemas.openxmlformats.org/drawingml/2006/main" xmlns:r="http://schemas.openxmlformats.org/officeDocument/2006/relationships" xmlns:p="http://schemas.openxmlformats.org/presentationml/2006/main">
   <p:cSld>
     <p:spTree>
@@ -6324,7 +7461,7 @@
 </p:sld>
 </file>
 
-<file path=ppt/slides/slide13.xml><?xml version="1.0" encoding="utf-8"?>
+<file path=ppt/slides/slide14.xml><?xml version="1.0" encoding="utf-8"?>
 <p:sld xmlns:a="http://schemas.openxmlformats.org/drawingml/2006/main" xmlns:r="http://schemas.openxmlformats.org/officeDocument/2006/relationships" xmlns:p="http://schemas.openxmlformats.org/presentationml/2006/main">
   <p:cSld>
     <p:spTree>
@@ -6819,7 +7956,7 @@
 </p:sld>
 </file>
 
-<file path=ppt/slides/slide14.xml><?xml version="1.0" encoding="utf-8"?>
+<file path=ppt/slides/slide15.xml><?xml version="1.0" encoding="utf-8"?>
 <p:sld xmlns:a="http://schemas.openxmlformats.org/drawingml/2006/main" xmlns:r="http://schemas.openxmlformats.org/officeDocument/2006/relationships" xmlns:p="http://schemas.openxmlformats.org/presentationml/2006/main">
   <p:cSld>
     <p:spTree>
@@ -6908,7 +8045,7 @@
 </p:sld>
 </file>
 
-<file path=ppt/slides/slide15.xml><?xml version="1.0" encoding="utf-8"?>
+<file path=ppt/slides/slide16.xml><?xml version="1.0" encoding="utf-8"?>
 <p:sld xmlns:a="http://schemas.openxmlformats.org/drawingml/2006/main" xmlns:r="http://schemas.openxmlformats.org/officeDocument/2006/relationships" xmlns:p="http://schemas.openxmlformats.org/presentationml/2006/main">
   <p:cSld>
     <p:spTree>
@@ -7711,7 +8848,7 @@
 </p:sld>
 </file>
 
-<file path=ppt/slides/slide16.xml><?xml version="1.0" encoding="utf-8"?>
+<file path=ppt/slides/slide17.xml><?xml version="1.0" encoding="utf-8"?>
 <p:sld xmlns:a="http://schemas.openxmlformats.org/drawingml/2006/main" xmlns:r="http://schemas.openxmlformats.org/officeDocument/2006/relationships" xmlns:p="http://schemas.openxmlformats.org/presentationml/2006/main">
   <p:cSld>
     <p:spTree>
@@ -8387,11 +9524,11 @@
   <p:clrMapOvr>
     <a:masterClrMapping/>
   </p:clrMapOvr>
-  <mc:AlternateContent xmlns:mc="http://schemas.openxmlformats.org/markup-compatibility/2006">
-    <mc:Choice xmlns:p14="http://schemas.microsoft.com/office/powerpoint/2010/main" Requires="p14">
+  <mc:AlternateContent xmlns:mc="http://schemas.openxmlformats.org/markup-compatibility/2006" xmlns:p14="http://schemas.microsoft.com/office/powerpoint/2010/main">
+    <mc:Choice Requires="p14">
       <p:transition spd="slow" p14:dur="2000" advClick="0" advTm="1000"/>
     </mc:Choice>
-    <mc:Fallback>
+    <mc:Fallback xmlns="">
       <p:transition spd="slow" advClick="0" advTm="1000"/>
     </mc:Fallback>
   </mc:AlternateContent>
@@ -8519,7 +9656,7 @@
 </p:sld>
 </file>
 
-<file path=ppt/slides/slide17.xml><?xml version="1.0" encoding="utf-8"?>
+<file path=ppt/slides/slide18.xml><?xml version="1.0" encoding="utf-8"?>
 <p:sld xmlns:a="http://schemas.openxmlformats.org/drawingml/2006/main" xmlns:r="http://schemas.openxmlformats.org/officeDocument/2006/relationships" xmlns:p="http://schemas.openxmlformats.org/presentationml/2006/main">
   <p:cSld>
     <p:spTree>
@@ -8598,7 +9735,7 @@
 </p:sld>
 </file>
 
-<file path=ppt/slides/slide18.xml><?xml version="1.0" encoding="utf-8"?>
+<file path=ppt/slides/slide19.xml><?xml version="1.0" encoding="utf-8"?>
 <p:sld xmlns:a="http://schemas.openxmlformats.org/drawingml/2006/main" xmlns:r="http://schemas.openxmlformats.org/officeDocument/2006/relationships" xmlns:p="http://schemas.openxmlformats.org/presentationml/2006/main">
   <p:cSld>
     <p:spTree>
@@ -8821,7 +9958,16 @@
                 </a:solidFill>
                 <a:latin typeface="Consolas" panose="020B0609020204030204" pitchFamily="49" charset="0"/>
               </a:rPr>
-              <a:t> length(</a:t>
+              <a:t> </a:t>
+            </a:r>
+            <a:r>
+              <a:rPr lang="en-US" b="1" dirty="0" smtClean="0">
+                <a:solidFill>
+                  <a:schemeClr val="bg1"/>
+                </a:solidFill>
+                <a:latin typeface="Consolas" panose="020B0609020204030204" pitchFamily="49" charset="0"/>
+              </a:rPr>
+              <a:t>count(</a:t>
             </a:r>
             <a:r>
               <a:rPr lang="en-US" b="1" dirty="0" err="1" smtClean="0">
@@ -8933,13 +10079,13 @@
           </a:p>
           <a:p>
             <a:r>
-              <a:rPr lang="en-US" b="1" dirty="0" smtClean="0">
+              <a:rPr lang="en-US" b="1" dirty="0">
                 <a:solidFill>
                   <a:schemeClr val="bg1"/>
                 </a:solidFill>
                 <a:latin typeface="Consolas" panose="020B0609020204030204" pitchFamily="49" charset="0"/>
               </a:rPr>
-              <a:t>length(List(</a:t>
+              <a:t>count(List(</a:t>
             </a:r>
             <a:r>
               <a:rPr lang="en-US" b="1" dirty="0" smtClean="0">
@@ -9031,13 +10177,22 @@
           </a:p>
           <a:p>
             <a:r>
+              <a:rPr lang="en-US" b="1" dirty="0">
+                <a:solidFill>
+                  <a:schemeClr val="bg1"/>
+                </a:solidFill>
+                <a:latin typeface="Consolas" panose="020B0609020204030204" pitchFamily="49" charset="0"/>
+              </a:rPr>
+              <a:t>count(List</a:t>
+            </a:r>
+            <a:r>
               <a:rPr lang="en-US" b="1" dirty="0" smtClean="0">
                 <a:solidFill>
                   <a:schemeClr val="bg1"/>
                 </a:solidFill>
                 <a:latin typeface="Consolas" panose="020B0609020204030204" pitchFamily="49" charset="0"/>
               </a:rPr>
-              <a:t>length(List(</a:t>
+              <a:t>(</a:t>
             </a:r>
             <a:r>
               <a:rPr lang="en-US" b="1" dirty="0" smtClean="0">
@@ -9146,7 +10301,16 @@
                 </a:solidFill>
                 <a:latin typeface="Consolas" panose="020B0609020204030204" pitchFamily="49" charset="0"/>
               </a:rPr>
-              <a:t> length(</a:t>
+              <a:t> </a:t>
+            </a:r>
+            <a:r>
+              <a:rPr lang="en-US" b="1" dirty="0">
+                <a:solidFill>
+                  <a:schemeClr val="bg1"/>
+                </a:solidFill>
+                <a:latin typeface="Consolas" panose="020B0609020204030204" pitchFamily="49" charset="0"/>
+              </a:rPr>
+              <a:t>count (</a:t>
             </a:r>
             <a:r>
               <a:rPr lang="en-US" b="1" dirty="0" err="1">
@@ -9264,7 +10428,16 @@
                 </a:solidFill>
                 <a:latin typeface="Consolas" panose="020B0609020204030204" pitchFamily="49" charset="0"/>
               </a:rPr>
-              <a:t>length(List(</a:t>
+              <a:t>count(List</a:t>
+            </a:r>
+            <a:r>
+              <a:rPr lang="en-US" b="1" dirty="0">
+                <a:solidFill>
+                  <a:schemeClr val="bg1"/>
+                </a:solidFill>
+                <a:latin typeface="Consolas" panose="020B0609020204030204" pitchFamily="49" charset="0"/>
+              </a:rPr>
+              <a:t>(</a:t>
             </a:r>
             <a:r>
               <a:rPr lang="en-US" b="1" dirty="0">
@@ -9365,13 +10538,13 @@
           </a:p>
           <a:p>
             <a:r>
-              <a:rPr lang="en-US" b="1" dirty="0" smtClean="0">
+              <a:rPr lang="en-US" b="1" dirty="0">
                 <a:solidFill>
                   <a:schemeClr val="bg1"/>
                 </a:solidFill>
                 <a:latin typeface="Consolas" panose="020B0609020204030204" pitchFamily="49" charset="0"/>
               </a:rPr>
-              <a:t>length(List(</a:t>
+              <a:t>count(List(</a:t>
             </a:r>
             <a:r>
               <a:rPr lang="en-US" b="1" dirty="0" smtClean="0">
@@ -9462,13 +10635,22 @@
               <a:t> </a:t>
             </a:r>
             <a:r>
+              <a:rPr lang="en-US" b="1" dirty="0">
+                <a:solidFill>
+                  <a:schemeClr val="bg1"/>
+                </a:solidFill>
+                <a:latin typeface="Consolas" panose="020B0609020204030204" pitchFamily="49" charset="0"/>
+              </a:rPr>
+              <a:t>count [</a:t>
+            </a:r>
+            <a:r>
               <a:rPr lang="en-US" b="1" dirty="0" smtClean="0">
                 <a:solidFill>
                   <a:schemeClr val="bg1"/>
                 </a:solidFill>
                 <a:latin typeface="Consolas" panose="020B0609020204030204" pitchFamily="49" charset="0"/>
               </a:rPr>
-              <a:t>length[A](</a:t>
+              <a:t>A](</a:t>
             </a:r>
             <a:r>
               <a:rPr lang="en-US" b="1" dirty="0" err="1" smtClean="0">
@@ -10040,7 +11222,280 @@
 </p:sld>
 </file>
 
-<file path=ppt/slides/slide19.xml><?xml version="1.0" encoding="utf-8"?>
+<file path=ppt/slides/slide2.xml><?xml version="1.0" encoding="utf-8"?>
+<p:sld xmlns:a="http://schemas.openxmlformats.org/drawingml/2006/main" xmlns:r="http://schemas.openxmlformats.org/officeDocument/2006/relationships" xmlns:p="http://schemas.openxmlformats.org/presentationml/2006/main">
+  <p:cSld>
+    <p:spTree>
+      <p:nvGrpSpPr>
+        <p:cNvPr id="1" name=""/>
+        <p:cNvGrpSpPr/>
+        <p:nvPr/>
+      </p:nvGrpSpPr>
+      <p:grpSpPr>
+        <a:xfrm>
+          <a:off x="0" y="0"/>
+          <a:ext cx="0" cy="0"/>
+          <a:chOff x="0" y="0"/>
+          <a:chExt cx="0" cy="0"/>
+        </a:xfrm>
+      </p:grpSpPr>
+      <p:sp>
+        <p:nvSpPr>
+          <p:cNvPr id="2" name="Titel 1"/>
+          <p:cNvSpPr>
+            <a:spLocks noGrp="1"/>
+          </p:cNvSpPr>
+          <p:nvPr>
+            <p:ph type="title"/>
+          </p:nvPr>
+        </p:nvSpPr>
+        <p:spPr/>
+        <p:txBody>
+          <a:bodyPr/>
+          <a:lstStyle/>
+          <a:p>
+            <a:r>
+              <a:rPr lang="nl-NL" dirty="0" smtClean="0"/>
+              <a:t>Types en waarden</a:t>
+            </a:r>
+            <a:endParaRPr lang="nl-NL" dirty="0"/>
+          </a:p>
+        </p:txBody>
+      </p:sp>
+      <p:sp>
+        <p:nvSpPr>
+          <p:cNvPr id="4" name="Tijdelijke aanduiding voor inhoud 3"/>
+          <p:cNvSpPr>
+            <a:spLocks noGrp="1"/>
+          </p:cNvSpPr>
+          <p:nvPr>
+            <p:ph sz="half" idx="1"/>
+          </p:nvPr>
+        </p:nvSpPr>
+        <p:spPr/>
+        <p:txBody>
+          <a:bodyPr>
+            <a:noAutofit/>
+          </a:bodyPr>
+          <a:lstStyle/>
+          <a:p>
+            <a:pPr marL="0" indent="0">
+              <a:buNone/>
+            </a:pPr>
+            <a:r>
+              <a:rPr lang="nl-NL" dirty="0" err="1" smtClean="0">
+                <a:latin typeface="Consolas" panose="020B0609020204030204" pitchFamily="49" charset="0"/>
+              </a:rPr>
+              <a:t>Boolean</a:t>
+            </a:r>
+            <a:endParaRPr lang="nl-NL" dirty="0" smtClean="0">
+              <a:latin typeface="Consolas" panose="020B0609020204030204" pitchFamily="49" charset="0"/>
+            </a:endParaRPr>
+          </a:p>
+          <a:p>
+            <a:pPr marL="0" indent="0">
+              <a:buNone/>
+            </a:pPr>
+            <a:endParaRPr lang="nl-NL" dirty="0" smtClean="0">
+              <a:latin typeface="Consolas" panose="020B0609020204030204" pitchFamily="49" charset="0"/>
+            </a:endParaRPr>
+          </a:p>
+          <a:p>
+            <a:pPr marL="0" indent="0">
+              <a:buNone/>
+            </a:pPr>
+            <a:r>
+              <a:rPr lang="nl-NL" dirty="0" smtClean="0">
+                <a:latin typeface="Consolas" panose="020B0609020204030204" pitchFamily="49" charset="0"/>
+              </a:rPr>
+              <a:t>Int</a:t>
+            </a:r>
+          </a:p>
+          <a:p>
+            <a:pPr marL="0" indent="0">
+              <a:buNone/>
+            </a:pPr>
+            <a:endParaRPr lang="nl-NL" dirty="0" smtClean="0">
+              <a:latin typeface="Consolas" panose="020B0609020204030204" pitchFamily="49" charset="0"/>
+            </a:endParaRPr>
+          </a:p>
+          <a:p>
+            <a:pPr marL="0" indent="0">
+              <a:buNone/>
+            </a:pPr>
+            <a:r>
+              <a:rPr lang="nl-NL" dirty="0" smtClean="0">
+                <a:latin typeface="Consolas" panose="020B0609020204030204" pitchFamily="49" charset="0"/>
+              </a:rPr>
+              <a:t>Double</a:t>
+            </a:r>
+          </a:p>
+          <a:p>
+            <a:pPr marL="0" indent="0">
+              <a:buNone/>
+            </a:pPr>
+            <a:endParaRPr lang="nl-NL" dirty="0" smtClean="0">
+              <a:latin typeface="Consolas" panose="020B0609020204030204" pitchFamily="49" charset="0"/>
+            </a:endParaRPr>
+          </a:p>
+          <a:p>
+            <a:pPr marL="0" indent="0">
+              <a:buNone/>
+            </a:pPr>
+            <a:r>
+              <a:rPr lang="nl-NL" dirty="0" smtClean="0">
+                <a:latin typeface="Consolas" panose="020B0609020204030204" pitchFamily="49" charset="0"/>
+              </a:rPr>
+              <a:t>String</a:t>
+            </a:r>
+            <a:endParaRPr lang="nl-NL" dirty="0">
+              <a:latin typeface="Consolas" panose="020B0609020204030204" pitchFamily="49" charset="0"/>
+            </a:endParaRPr>
+          </a:p>
+        </p:txBody>
+      </p:sp>
+      <p:sp>
+        <p:nvSpPr>
+          <p:cNvPr id="5" name="Tijdelijke aanduiding voor inhoud 4"/>
+          <p:cNvSpPr>
+            <a:spLocks noGrp="1"/>
+          </p:cNvSpPr>
+          <p:nvPr>
+            <p:ph sz="half" idx="2"/>
+          </p:nvPr>
+        </p:nvSpPr>
+        <p:spPr>
+          <a:xfrm>
+            <a:off x="2267744" y="1200151"/>
+            <a:ext cx="6624736" cy="3394472"/>
+          </a:xfrm>
+        </p:spPr>
+        <p:txBody>
+          <a:bodyPr>
+            <a:noAutofit/>
+          </a:bodyPr>
+          <a:lstStyle/>
+          <a:p>
+            <a:pPr marL="0" indent="0">
+              <a:buNone/>
+            </a:pPr>
+            <a:r>
+              <a:rPr lang="nl-NL" dirty="0" err="1" smtClean="0">
+                <a:latin typeface="Consolas" panose="020B0609020204030204" pitchFamily="49" charset="0"/>
+              </a:rPr>
+              <a:t>true</a:t>
+            </a:r>
+            <a:r>
+              <a:rPr lang="nl-NL" dirty="0" smtClean="0">
+                <a:latin typeface="Consolas" panose="020B0609020204030204" pitchFamily="49" charset="0"/>
+              </a:rPr>
+              <a:t>, </a:t>
+            </a:r>
+            <a:r>
+              <a:rPr lang="nl-NL" dirty="0" err="1" smtClean="0">
+                <a:latin typeface="Consolas" panose="020B0609020204030204" pitchFamily="49" charset="0"/>
+              </a:rPr>
+              <a:t>false</a:t>
+            </a:r>
+            <a:endParaRPr lang="nl-NL" dirty="0" smtClean="0">
+              <a:latin typeface="Consolas" panose="020B0609020204030204" pitchFamily="49" charset="0"/>
+            </a:endParaRPr>
+          </a:p>
+          <a:p>
+            <a:pPr marL="0" indent="0">
+              <a:buNone/>
+            </a:pPr>
+            <a:endParaRPr lang="nl-NL" dirty="0" smtClean="0">
+              <a:latin typeface="Consolas" panose="020B0609020204030204" pitchFamily="49" charset="0"/>
+            </a:endParaRPr>
+          </a:p>
+          <a:p>
+            <a:pPr marL="0" indent="0">
+              <a:buNone/>
+            </a:pPr>
+            <a:r>
+              <a:rPr lang="nl-NL" dirty="0" smtClean="0">
+                <a:latin typeface="Consolas" panose="020B0609020204030204" pitchFamily="49" charset="0"/>
+              </a:rPr>
+              <a:t>0, 1, 2, -42, -122, …</a:t>
+            </a:r>
+          </a:p>
+          <a:p>
+            <a:pPr marL="0" indent="0">
+              <a:buNone/>
+            </a:pPr>
+            <a:endParaRPr lang="nl-NL" dirty="0" smtClean="0">
+              <a:latin typeface="Consolas" panose="020B0609020204030204" pitchFamily="49" charset="0"/>
+            </a:endParaRPr>
+          </a:p>
+          <a:p>
+            <a:pPr marL="0" indent="0">
+              <a:buNone/>
+            </a:pPr>
+            <a:r>
+              <a:rPr lang="nl-NL" dirty="0" smtClean="0">
+                <a:latin typeface="Consolas" panose="020B0609020204030204" pitchFamily="49" charset="0"/>
+              </a:rPr>
+              <a:t>0.0, 1.0, 0.5, -7.36, </a:t>
+            </a:r>
+            <a:r>
+              <a:rPr lang="nl-NL" dirty="0" err="1" smtClean="0">
+                <a:latin typeface="Consolas" panose="020B0609020204030204" pitchFamily="49" charset="0"/>
+              </a:rPr>
+              <a:t>math.pi</a:t>
+            </a:r>
+            <a:r>
+              <a:rPr lang="nl-NL" dirty="0" smtClean="0">
+                <a:latin typeface="Consolas" panose="020B0609020204030204" pitchFamily="49" charset="0"/>
+              </a:rPr>
+              <a:t>, …</a:t>
+            </a:r>
+          </a:p>
+          <a:p>
+            <a:pPr marL="0" indent="0">
+              <a:buNone/>
+            </a:pPr>
+            <a:endParaRPr lang="nl-NL" dirty="0" smtClean="0">
+              <a:latin typeface="Consolas" panose="020B0609020204030204" pitchFamily="49" charset="0"/>
+            </a:endParaRPr>
+          </a:p>
+          <a:p>
+            <a:pPr marL="0" indent="0">
+              <a:buNone/>
+            </a:pPr>
+            <a:r>
+              <a:rPr lang="nl-NL" dirty="0" smtClean="0">
+                <a:latin typeface="Consolas" panose="020B0609020204030204" pitchFamily="49" charset="0"/>
+              </a:rPr>
+              <a:t>"", "abc", "dit is een zin", … </a:t>
+            </a:r>
+            <a:endParaRPr lang="nl-NL" dirty="0">
+              <a:latin typeface="Consolas" panose="020B0609020204030204" pitchFamily="49" charset="0"/>
+            </a:endParaRPr>
+          </a:p>
+        </p:txBody>
+      </p:sp>
+    </p:spTree>
+    <p:extLst>
+      <p:ext uri="{BB962C8B-B14F-4D97-AF65-F5344CB8AC3E}">
+        <p14:creationId xmlns:p14="http://schemas.microsoft.com/office/powerpoint/2010/main" val="1059875961"/>
+      </p:ext>
+    </p:extLst>
+  </p:cSld>
+  <p:clrMapOvr>
+    <a:masterClrMapping/>
+  </p:clrMapOvr>
+  <p:timing>
+    <p:tnLst>
+      <p:par>
+        <p:cTn id="1" dur="indefinite" restart="never" nodeType="tmRoot"/>
+      </p:par>
+    </p:tnLst>
+  </p:timing>
+</p:sld>
+</file>
+
+<file path=ppt/slides/slide20.xml><?xml version="1.0" encoding="utf-8"?>
 <p:sld xmlns:a="http://schemas.openxmlformats.org/drawingml/2006/main" xmlns:r="http://schemas.openxmlformats.org/officeDocument/2006/relationships" xmlns:p="http://schemas.openxmlformats.org/presentationml/2006/main">
   <p:cSld>
     <p:spTree>
@@ -10209,7 +11664,34 @@
                 </a:solidFill>
                 <a:latin typeface="Consolas" panose="020B0609020204030204" pitchFamily="49" charset="0"/>
               </a:rPr>
-              <a:t> length[A](</a:t>
+              <a:t> </a:t>
+            </a:r>
+            <a:r>
+              <a:rPr lang="en-US" b="1" dirty="0" smtClean="0">
+                <a:solidFill>
+                  <a:schemeClr val="bg1"/>
+                </a:solidFill>
+                <a:latin typeface="Consolas" panose="020B0609020204030204" pitchFamily="49" charset="0"/>
+              </a:rPr>
+              <a:t>count[</a:t>
+            </a:r>
+            <a:r>
+              <a:rPr lang="en-US" b="1" dirty="0" smtClean="0">
+                <a:solidFill>
+                  <a:schemeClr val="bg1"/>
+                </a:solidFill>
+                <a:latin typeface="Consolas" panose="020B0609020204030204" pitchFamily="49" charset="0"/>
+              </a:rPr>
+              <a:t>A</a:t>
+            </a:r>
+            <a:r>
+              <a:rPr lang="en-US" b="1" dirty="0">
+                <a:solidFill>
+                  <a:schemeClr val="bg1"/>
+                </a:solidFill>
+                <a:latin typeface="Consolas" panose="020B0609020204030204" pitchFamily="49" charset="0"/>
+              </a:rPr>
+              <a:t>](</a:t>
             </a:r>
             <a:r>
               <a:rPr lang="en-US" b="1" dirty="0" err="1">
@@ -10338,13 +11820,13 @@
           </a:p>
           <a:p>
             <a:r>
-              <a:rPr lang="en-US" b="1" dirty="0" smtClean="0">
+              <a:rPr lang="en-US" b="1" dirty="0">
                 <a:solidFill>
                   <a:schemeClr val="bg1"/>
                 </a:solidFill>
                 <a:latin typeface="Consolas" panose="020B0609020204030204" pitchFamily="49" charset="0"/>
               </a:rPr>
-              <a:t>length(List(</a:t>
+              <a:t>count(List(</a:t>
             </a:r>
             <a:r>
               <a:rPr lang="en-US" b="1" dirty="0" smtClean="0">
@@ -10436,13 +11918,22 @@
           </a:p>
           <a:p>
             <a:r>
+              <a:rPr lang="en-US" b="1" dirty="0">
+                <a:solidFill>
+                  <a:schemeClr val="bg1"/>
+                </a:solidFill>
+                <a:latin typeface="Consolas" panose="020B0609020204030204" pitchFamily="49" charset="0"/>
+              </a:rPr>
+              <a:t>count(List</a:t>
+            </a:r>
+            <a:r>
               <a:rPr lang="en-US" b="1" dirty="0" smtClean="0">
                 <a:solidFill>
                   <a:schemeClr val="bg1"/>
                 </a:solidFill>
                 <a:latin typeface="Consolas" panose="020B0609020204030204" pitchFamily="49" charset="0"/>
               </a:rPr>
-              <a:t>length(List(</a:t>
+              <a:t>(</a:t>
             </a:r>
             <a:r>
               <a:rPr lang="en-US" b="1" dirty="0" smtClean="0">
@@ -10528,13 +12019,13 @@
           </a:p>
           <a:p>
             <a:r>
-              <a:rPr lang="en-US" b="1" dirty="0" smtClean="0">
+              <a:rPr lang="en-US" b="1" dirty="0">
                 <a:solidFill>
                   <a:schemeClr val="bg1"/>
                 </a:solidFill>
                 <a:latin typeface="Consolas" panose="020B0609020204030204" pitchFamily="49" charset="0"/>
               </a:rPr>
-              <a:t>length(List(</a:t>
+              <a:t>count(List(</a:t>
             </a:r>
             <a:r>
               <a:rPr lang="en-US" b="1" dirty="0" smtClean="0">
@@ -11073,6 +12564,9 @@
                     <p:cTn id="3" fill="hold">
                       <p:stCondLst>
                         <p:cond delay="indefinite"/>
+                        <p:cond evt="onBegin" delay="0">
+                          <p:tn val="2"/>
+                        </p:cond>
                       </p:stCondLst>
                       <p:childTnLst>
                         <p:par>
@@ -11082,7 +12576,7 @@
                             </p:stCondLst>
                             <p:childTnLst>
                               <p:par>
-                                <p:cTn id="5" presetID="1" presetClass="entr" presetSubtype="0" fill="hold" nodeType="clickEffect">
+                                <p:cTn id="5" presetID="1" presetClass="entr" presetSubtype="0" fill="hold" nodeType="withEffect">
                                   <p:stCondLst>
                                     <p:cond delay="0"/>
                                   </p:stCondLst>
@@ -11440,280 +12934,7 @@
 </p:sld>
 </file>
 
-<file path=ppt/slides/slide2.xml><?xml version="1.0" encoding="utf-8"?>
-<p:sld xmlns:a="http://schemas.openxmlformats.org/drawingml/2006/main" xmlns:r="http://schemas.openxmlformats.org/officeDocument/2006/relationships" xmlns:p="http://schemas.openxmlformats.org/presentationml/2006/main">
-  <p:cSld>
-    <p:spTree>
-      <p:nvGrpSpPr>
-        <p:cNvPr id="1" name=""/>
-        <p:cNvGrpSpPr/>
-        <p:nvPr/>
-      </p:nvGrpSpPr>
-      <p:grpSpPr>
-        <a:xfrm>
-          <a:off x="0" y="0"/>
-          <a:ext cx="0" cy="0"/>
-          <a:chOff x="0" y="0"/>
-          <a:chExt cx="0" cy="0"/>
-        </a:xfrm>
-      </p:grpSpPr>
-      <p:sp>
-        <p:nvSpPr>
-          <p:cNvPr id="2" name="Titel 1"/>
-          <p:cNvSpPr>
-            <a:spLocks noGrp="1"/>
-          </p:cNvSpPr>
-          <p:nvPr>
-            <p:ph type="title"/>
-          </p:nvPr>
-        </p:nvSpPr>
-        <p:spPr/>
-        <p:txBody>
-          <a:bodyPr/>
-          <a:lstStyle/>
-          <a:p>
-            <a:r>
-              <a:rPr lang="nl-NL" dirty="0" smtClean="0"/>
-              <a:t>Types en waarden</a:t>
-            </a:r>
-            <a:endParaRPr lang="nl-NL" dirty="0"/>
-          </a:p>
-        </p:txBody>
-      </p:sp>
-      <p:sp>
-        <p:nvSpPr>
-          <p:cNvPr id="4" name="Tijdelijke aanduiding voor inhoud 3"/>
-          <p:cNvSpPr>
-            <a:spLocks noGrp="1"/>
-          </p:cNvSpPr>
-          <p:nvPr>
-            <p:ph sz="half" idx="1"/>
-          </p:nvPr>
-        </p:nvSpPr>
-        <p:spPr/>
-        <p:txBody>
-          <a:bodyPr>
-            <a:noAutofit/>
-          </a:bodyPr>
-          <a:lstStyle/>
-          <a:p>
-            <a:pPr marL="0" indent="0">
-              <a:buNone/>
-            </a:pPr>
-            <a:r>
-              <a:rPr lang="nl-NL" dirty="0" err="1" smtClean="0">
-                <a:latin typeface="Consolas" panose="020B0609020204030204" pitchFamily="49" charset="0"/>
-              </a:rPr>
-              <a:t>Boolean</a:t>
-            </a:r>
-            <a:endParaRPr lang="nl-NL" dirty="0" smtClean="0">
-              <a:latin typeface="Consolas" panose="020B0609020204030204" pitchFamily="49" charset="0"/>
-            </a:endParaRPr>
-          </a:p>
-          <a:p>
-            <a:pPr marL="0" indent="0">
-              <a:buNone/>
-            </a:pPr>
-            <a:endParaRPr lang="nl-NL" dirty="0" smtClean="0">
-              <a:latin typeface="Consolas" panose="020B0609020204030204" pitchFamily="49" charset="0"/>
-            </a:endParaRPr>
-          </a:p>
-          <a:p>
-            <a:pPr marL="0" indent="0">
-              <a:buNone/>
-            </a:pPr>
-            <a:r>
-              <a:rPr lang="nl-NL" dirty="0" smtClean="0">
-                <a:latin typeface="Consolas" panose="020B0609020204030204" pitchFamily="49" charset="0"/>
-              </a:rPr>
-              <a:t>Int</a:t>
-            </a:r>
-          </a:p>
-          <a:p>
-            <a:pPr marL="0" indent="0">
-              <a:buNone/>
-            </a:pPr>
-            <a:endParaRPr lang="nl-NL" dirty="0" smtClean="0">
-              <a:latin typeface="Consolas" panose="020B0609020204030204" pitchFamily="49" charset="0"/>
-            </a:endParaRPr>
-          </a:p>
-          <a:p>
-            <a:pPr marL="0" indent="0">
-              <a:buNone/>
-            </a:pPr>
-            <a:r>
-              <a:rPr lang="nl-NL" dirty="0" smtClean="0">
-                <a:latin typeface="Consolas" panose="020B0609020204030204" pitchFamily="49" charset="0"/>
-              </a:rPr>
-              <a:t>Double</a:t>
-            </a:r>
-          </a:p>
-          <a:p>
-            <a:pPr marL="0" indent="0">
-              <a:buNone/>
-            </a:pPr>
-            <a:endParaRPr lang="nl-NL" dirty="0" smtClean="0">
-              <a:latin typeface="Consolas" panose="020B0609020204030204" pitchFamily="49" charset="0"/>
-            </a:endParaRPr>
-          </a:p>
-          <a:p>
-            <a:pPr marL="0" indent="0">
-              <a:buNone/>
-            </a:pPr>
-            <a:r>
-              <a:rPr lang="nl-NL" dirty="0" smtClean="0">
-                <a:latin typeface="Consolas" panose="020B0609020204030204" pitchFamily="49" charset="0"/>
-              </a:rPr>
-              <a:t>String</a:t>
-            </a:r>
-            <a:endParaRPr lang="nl-NL" dirty="0">
-              <a:latin typeface="Consolas" panose="020B0609020204030204" pitchFamily="49" charset="0"/>
-            </a:endParaRPr>
-          </a:p>
-        </p:txBody>
-      </p:sp>
-      <p:sp>
-        <p:nvSpPr>
-          <p:cNvPr id="5" name="Tijdelijke aanduiding voor inhoud 4"/>
-          <p:cNvSpPr>
-            <a:spLocks noGrp="1"/>
-          </p:cNvSpPr>
-          <p:nvPr>
-            <p:ph sz="half" idx="2"/>
-          </p:nvPr>
-        </p:nvSpPr>
-        <p:spPr>
-          <a:xfrm>
-            <a:off x="2267744" y="1200151"/>
-            <a:ext cx="6624736" cy="3394472"/>
-          </a:xfrm>
-        </p:spPr>
-        <p:txBody>
-          <a:bodyPr>
-            <a:noAutofit/>
-          </a:bodyPr>
-          <a:lstStyle/>
-          <a:p>
-            <a:pPr marL="0" indent="0">
-              <a:buNone/>
-            </a:pPr>
-            <a:r>
-              <a:rPr lang="nl-NL" dirty="0" err="1" smtClean="0">
-                <a:latin typeface="Consolas" panose="020B0609020204030204" pitchFamily="49" charset="0"/>
-              </a:rPr>
-              <a:t>true</a:t>
-            </a:r>
-            <a:r>
-              <a:rPr lang="nl-NL" dirty="0" smtClean="0">
-                <a:latin typeface="Consolas" panose="020B0609020204030204" pitchFamily="49" charset="0"/>
-              </a:rPr>
-              <a:t>, </a:t>
-            </a:r>
-            <a:r>
-              <a:rPr lang="nl-NL" dirty="0" err="1" smtClean="0">
-                <a:latin typeface="Consolas" panose="020B0609020204030204" pitchFamily="49" charset="0"/>
-              </a:rPr>
-              <a:t>false</a:t>
-            </a:r>
-            <a:endParaRPr lang="nl-NL" dirty="0" smtClean="0">
-              <a:latin typeface="Consolas" panose="020B0609020204030204" pitchFamily="49" charset="0"/>
-            </a:endParaRPr>
-          </a:p>
-          <a:p>
-            <a:pPr marL="0" indent="0">
-              <a:buNone/>
-            </a:pPr>
-            <a:endParaRPr lang="nl-NL" dirty="0" smtClean="0">
-              <a:latin typeface="Consolas" panose="020B0609020204030204" pitchFamily="49" charset="0"/>
-            </a:endParaRPr>
-          </a:p>
-          <a:p>
-            <a:pPr marL="0" indent="0">
-              <a:buNone/>
-            </a:pPr>
-            <a:r>
-              <a:rPr lang="nl-NL" dirty="0" smtClean="0">
-                <a:latin typeface="Consolas" panose="020B0609020204030204" pitchFamily="49" charset="0"/>
-              </a:rPr>
-              <a:t>0, 1, 2, -42, -122, …</a:t>
-            </a:r>
-          </a:p>
-          <a:p>
-            <a:pPr marL="0" indent="0">
-              <a:buNone/>
-            </a:pPr>
-            <a:endParaRPr lang="nl-NL" dirty="0" smtClean="0">
-              <a:latin typeface="Consolas" panose="020B0609020204030204" pitchFamily="49" charset="0"/>
-            </a:endParaRPr>
-          </a:p>
-          <a:p>
-            <a:pPr marL="0" indent="0">
-              <a:buNone/>
-            </a:pPr>
-            <a:r>
-              <a:rPr lang="nl-NL" dirty="0" smtClean="0">
-                <a:latin typeface="Consolas" panose="020B0609020204030204" pitchFamily="49" charset="0"/>
-              </a:rPr>
-              <a:t>0.0, 1.0, 0.5, -7.36, </a:t>
-            </a:r>
-            <a:r>
-              <a:rPr lang="nl-NL" dirty="0" err="1" smtClean="0">
-                <a:latin typeface="Consolas" panose="020B0609020204030204" pitchFamily="49" charset="0"/>
-              </a:rPr>
-              <a:t>math.pi</a:t>
-            </a:r>
-            <a:r>
-              <a:rPr lang="nl-NL" dirty="0" smtClean="0">
-                <a:latin typeface="Consolas" panose="020B0609020204030204" pitchFamily="49" charset="0"/>
-              </a:rPr>
-              <a:t>, …</a:t>
-            </a:r>
-          </a:p>
-          <a:p>
-            <a:pPr marL="0" indent="0">
-              <a:buNone/>
-            </a:pPr>
-            <a:endParaRPr lang="nl-NL" dirty="0" smtClean="0">
-              <a:latin typeface="Consolas" panose="020B0609020204030204" pitchFamily="49" charset="0"/>
-            </a:endParaRPr>
-          </a:p>
-          <a:p>
-            <a:pPr marL="0" indent="0">
-              <a:buNone/>
-            </a:pPr>
-            <a:r>
-              <a:rPr lang="nl-NL" dirty="0" smtClean="0">
-                <a:latin typeface="Consolas" panose="020B0609020204030204" pitchFamily="49" charset="0"/>
-              </a:rPr>
-              <a:t>"", "abc", "dit is een zin", … </a:t>
-            </a:r>
-            <a:endParaRPr lang="nl-NL" dirty="0">
-              <a:latin typeface="Consolas" panose="020B0609020204030204" pitchFamily="49" charset="0"/>
-            </a:endParaRPr>
-          </a:p>
-        </p:txBody>
-      </p:sp>
-    </p:spTree>
-    <p:extLst>
-      <p:ext uri="{BB962C8B-B14F-4D97-AF65-F5344CB8AC3E}">
-        <p14:creationId xmlns:p14="http://schemas.microsoft.com/office/powerpoint/2010/main" val="1059875961"/>
-      </p:ext>
-    </p:extLst>
-  </p:cSld>
-  <p:clrMapOvr>
-    <a:masterClrMapping/>
-  </p:clrMapOvr>
-  <p:timing>
-    <p:tnLst>
-      <p:par>
-        <p:cTn id="1" dur="indefinite" restart="never" nodeType="tmRoot"/>
-      </p:par>
-    </p:tnLst>
-  </p:timing>
-</p:sld>
-</file>
-
-<file path=ppt/slides/slide20.xml><?xml version="1.0" encoding="utf-8"?>
+<file path=ppt/slides/slide21.xml><?xml version="1.0" encoding="utf-8"?>
 <p:sld xmlns:a="http://schemas.openxmlformats.org/drawingml/2006/main" xmlns:r="http://schemas.openxmlformats.org/officeDocument/2006/relationships" xmlns:p="http://schemas.openxmlformats.org/presentationml/2006/main">
   <p:cSld>
     <p:spTree>
@@ -11896,7 +13117,34 @@
                   </a:solidFill>
                   <a:latin typeface="Consolas" panose="020B0609020204030204" pitchFamily="49" charset="0"/>
                 </a:rPr>
-                <a:t> length[A](</a:t>
+                <a:t> </a:t>
+              </a:r>
+              <a:r>
+                <a:rPr lang="en-US" b="1" dirty="0" smtClean="0">
+                  <a:solidFill>
+                    <a:schemeClr val="bg1"/>
+                  </a:solidFill>
+                  <a:latin typeface="Consolas" panose="020B0609020204030204" pitchFamily="49" charset="0"/>
+                </a:rPr>
+                <a:t>count[</a:t>
+              </a:r>
+              <a:r>
+                <a:rPr lang="en-US" b="1" dirty="0" smtClean="0">
+                  <a:solidFill>
+                    <a:schemeClr val="bg1"/>
+                  </a:solidFill>
+                  <a:latin typeface="Consolas" panose="020B0609020204030204" pitchFamily="49" charset="0"/>
+                </a:rPr>
+                <a:t>A</a:t>
+              </a:r>
+              <a:r>
+                <a:rPr lang="en-US" b="1" dirty="0">
+                  <a:solidFill>
+                    <a:schemeClr val="bg1"/>
+                  </a:solidFill>
+                  <a:latin typeface="Consolas" panose="020B0609020204030204" pitchFamily="49" charset="0"/>
+                </a:rPr>
+                <a:t>](</a:t>
               </a:r>
               <a:r>
                 <a:rPr lang="en-US" b="1" dirty="0" err="1">
@@ -12025,13 +13273,13 @@
             </a:p>
             <a:p>
               <a:r>
-                <a:rPr lang="en-US" b="1" dirty="0" smtClean="0">
-                  <a:solidFill>
-                    <a:schemeClr val="bg1"/>
-                  </a:solidFill>
-                  <a:latin typeface="Consolas" panose="020B0609020204030204" pitchFamily="49" charset="0"/>
-                </a:rPr>
-                <a:t>length(List(</a:t>
+                <a:rPr lang="en-US" b="1" dirty="0">
+                  <a:solidFill>
+                    <a:schemeClr val="bg1"/>
+                  </a:solidFill>
+                  <a:latin typeface="Consolas" panose="020B0609020204030204" pitchFamily="49" charset="0"/>
+                </a:rPr>
+                <a:t>count(List(</a:t>
               </a:r>
               <a:r>
                 <a:rPr lang="en-US" b="1" dirty="0" smtClean="0">
@@ -12123,13 +13371,22 @@
             </a:p>
             <a:p>
               <a:r>
-                <a:rPr lang="en-US" b="1" dirty="0" smtClean="0">
-                  <a:solidFill>
-                    <a:schemeClr val="bg1"/>
-                  </a:solidFill>
-                  <a:latin typeface="Consolas" panose="020B0609020204030204" pitchFamily="49" charset="0"/>
-                </a:rPr>
-                <a:t>length(List(</a:t>
+                <a:rPr lang="en-US" b="1" dirty="0">
+                  <a:solidFill>
+                    <a:schemeClr val="bg1"/>
+                  </a:solidFill>
+                  <a:latin typeface="Consolas" panose="020B0609020204030204" pitchFamily="49" charset="0"/>
+                </a:rPr>
+                <a:t>count(List</a:t>
+              </a:r>
+              <a:r>
+                <a:rPr lang="en-US" b="1" dirty="0" smtClean="0">
+                  <a:solidFill>
+                    <a:schemeClr val="bg1"/>
+                  </a:solidFill>
+                  <a:latin typeface="Consolas" panose="020B0609020204030204" pitchFamily="49" charset="0"/>
+                </a:rPr>
+                <a:t>(</a:t>
               </a:r>
               <a:r>
                 <a:rPr lang="en-US" b="1" dirty="0" smtClean="0">
@@ -12215,13 +13472,13 @@
             </a:p>
             <a:p>
               <a:r>
-                <a:rPr lang="en-US" b="1" dirty="0" smtClean="0">
-                  <a:solidFill>
-                    <a:schemeClr val="bg1"/>
-                  </a:solidFill>
-                  <a:latin typeface="Consolas" panose="020B0609020204030204" pitchFamily="49" charset="0"/>
-                </a:rPr>
-                <a:t>length(List(</a:t>
+                <a:rPr lang="en-US" b="1" dirty="0">
+                  <a:solidFill>
+                    <a:schemeClr val="bg1"/>
+                  </a:solidFill>
+                  <a:latin typeface="Consolas" panose="020B0609020204030204" pitchFamily="49" charset="0"/>
+                </a:rPr>
+                <a:t>count(List(</a:t>
               </a:r>
               <a:r>
                 <a:rPr lang="en-US" b="1" dirty="0" smtClean="0">
@@ -12749,11 +14006,11 @@
   <p:clrMapOvr>
     <a:masterClrMapping/>
   </p:clrMapOvr>
-  <mc:AlternateContent xmlns:mc="http://schemas.openxmlformats.org/markup-compatibility/2006">
-    <mc:Choice xmlns:p14="http://schemas.microsoft.com/office/powerpoint/2010/main" Requires="p14">
+  <mc:AlternateContent xmlns:mc="http://schemas.openxmlformats.org/markup-compatibility/2006" xmlns:p14="http://schemas.microsoft.com/office/powerpoint/2010/main">
+    <mc:Choice Requires="p14">
       <p:transition spd="slow" p14:dur="2000" advClick="0" advTm="1000"/>
     </mc:Choice>
-    <mc:Fallback>
+    <mc:Fallback xmlns="">
       <p:transition spd="slow" advClick="0" advTm="1000"/>
     </mc:Fallback>
   </mc:AlternateContent>
@@ -12884,7 +14141,7 @@
 </p:sld>
 </file>
 
-<file path=ppt/slides/slide21.xml><?xml version="1.0" encoding="utf-8"?>
+<file path=ppt/slides/slide22.xml><?xml version="1.0" encoding="utf-8"?>
 <p:sld xmlns:a="http://schemas.openxmlformats.org/drawingml/2006/main" xmlns:r="http://schemas.openxmlformats.org/officeDocument/2006/relationships" xmlns:p="http://schemas.openxmlformats.org/presentationml/2006/main">
   <p:cSld>
     <p:spTree>
@@ -12983,7 +14240,7 @@
 </p:sld>
 </file>
 
-<file path=ppt/slides/slide22.xml><?xml version="1.0" encoding="utf-8"?>
+<file path=ppt/slides/slide23.xml><?xml version="1.0" encoding="utf-8"?>
 <p:sld xmlns:a="http://schemas.openxmlformats.org/drawingml/2006/main" xmlns:r="http://schemas.openxmlformats.org/officeDocument/2006/relationships" xmlns:p="http://schemas.openxmlformats.org/presentationml/2006/main">
   <p:cSld>
     <p:spTree>
@@ -15200,11 +16457,11 @@
   <p:clrMapOvr>
     <a:masterClrMapping/>
   </p:clrMapOvr>
-  <mc:AlternateContent xmlns:mc="http://schemas.openxmlformats.org/markup-compatibility/2006">
-    <mc:Choice xmlns:p14="http://schemas.microsoft.com/office/powerpoint/2010/main" Requires="p14">
+  <mc:AlternateContent xmlns:mc="http://schemas.openxmlformats.org/markup-compatibility/2006" xmlns:p14="http://schemas.microsoft.com/office/powerpoint/2010/main">
+    <mc:Choice Requires="p14">
       <p:transition spd="slow" p14:dur="2000" advClick="0" advTm="1000"/>
     </mc:Choice>
-    <mc:Fallback>
+    <mc:Fallback xmlns="">
       <p:transition spd="slow" advClick="0" advTm="1000"/>
     </mc:Fallback>
   </mc:AlternateContent>
@@ -15575,6 +16832,9 @@
                     <p:cTn id="3" fill="hold">
                       <p:stCondLst>
                         <p:cond delay="indefinite"/>
+                        <p:cond evt="onBegin" delay="0">
+                          <p:tn val="2"/>
+                        </p:cond>
                       </p:stCondLst>
                       <p:childTnLst>
                         <p:par>
@@ -15584,7 +16844,7 @@
                             </p:stCondLst>
                             <p:childTnLst>
                               <p:par>
-                                <p:cTn id="5" presetID="1" presetClass="entr" presetSubtype="0" fill="hold" grpId="0" nodeType="clickEffect">
+                                <p:cTn id="5" presetID="1" presetClass="entr" presetSubtype="0" fill="hold" grpId="0" nodeType="withEffect">
                                   <p:stCondLst>
                                     <p:cond delay="0"/>
                                   </p:stCondLst>

</xml_diff>